<commit_message>
Added product catalogue template
</commit_message>
<xml_diff>
--- a/week_9/Design Patterns.pptx
+++ b/week_9/Design Patterns.pptx
@@ -8729,6 +8729,38 @@
 </dgm:styleDef>
 </file>
 
+<file path=ppt/ink/ink1.xml><?xml version="1.0" encoding="utf-8"?>
+<inkml:ink xmlns:inkml="http://www.w3.org/2003/InkML">
+  <inkml:definitions>
+    <inkml:context xml:id="ctx0">
+      <inkml:inkSource xml:id="inkSrc0">
+        <inkml:traceFormat>
+          <inkml:channel name="X" type="integer" max="2560" units="cm"/>
+          <inkml:channel name="Y" type="integer" max="1440" units="cm"/>
+          <inkml:channel name="T" type="integer" max="2.14748E9" units="dev"/>
+        </inkml:traceFormat>
+        <inkml:channelProperties>
+          <inkml:channelProperty channel="X" name="resolution" value="42.03613" units="1/cm"/>
+          <inkml:channelProperty channel="Y" name="resolution" value="40.56338" units="1/cm"/>
+          <inkml:channelProperty channel="T" name="resolution" value="1" units="1/dev"/>
+        </inkml:channelProperties>
+      </inkml:inkSource>
+      <inkml:timestamp xml:id="ts0" timeString="2023-05-22T00:57:30.880"/>
+    </inkml:context>
+    <inkml:brush xml:id="br0">
+      <inkml:brushProperty name="width" value="0.05292" units="cm"/>
+      <inkml:brushProperty name="height" value="0.05292" units="cm"/>
+      <inkml:brushProperty name="color" value="#00B050"/>
+    </inkml:brush>
+  </inkml:definitions>
+  <inkml:trace contextRef="#ctx0" brushRef="#br0">25519 15055 0,'13'0'47,"1"0"-47,12 0 16,-13 0-16,0 0 0,1 0 0,-1 0 0,0 0 0,0 0 0,14 0 15,-14 0-15,0 0 0,1 0 0,-1 0 0,0 0 0,0 0 0,14 0 0,-14 0 0,0 13 0,0-13 16,1 0-16,-1 0 0,0 0 0,0 0 0,14 0 0,-14 0 0,0 0 0,0 0 0,1 13 0,-1-13 0,0 0 0,14 0 0,-14 0 16,0 0-16,0 0 0,0 0 0,1 0 0,-1 13 0,13-13 0,-12 0 0,-1 0 0,0 0 0,0 0 0,1 0 0,-1 14 0,0-14 15,13 0-15,-12 0 0,-1 0 0,0 0 0,0 13 0,1-13 0,-1 0 0,13 0 0,-13 0 0,1 0 0,-14 26 0,13-26 0,0 0 16,0 0-16,1 0 0,12 0 0,-13 0 0,1 14 0,-1-14 0,0 0 0,0 0 0,0 0 0,14 0 0,-14 0 15,0 13-15,1-13 0,-1 0 0,0 0 0,0 0 0,1 0 0,12 0 0,-13 0 0,0 0 16,1 0-16,-1 0 0,0 0 0,0 0 0,14 0 0,-14 0 0,0 0 16,1 0-16,-1 0 0,0 0 0,0 0 0,14 0 0,-14 0 0,0 0 0,0 0 15,1 0-15,-1 0 0,0 0 0,14 0 0,-14 0 0,0 0 0,0 0 0,0 0 16,1 0-16,-1 0 0,0 0 0,14 0 0,-14 0 0,0 0 16,0 0-16,0 0 0,1 0 0,-1 0 0,-13-13 0,26 13 0,-12 0 15,-1 0-15,0 0 0,0 0 0,-13-27 0,14 27 0,-1 0 16,13 0-16,-13 0 0,1 0 0,-14-13 0,13 13 15,0 0-15,0 0 0,1 0 16,-14-13-16,26 13 0,-13 0 0,1-14 16,-1 14-16,0-13 0,0 13 0,0-13 15,1 13-15,12-13 0,-13 13 16,-13-27-16,14 27 0,-1 0 0,-13-13 0,13 13 16,-13-13-16,13 13 0,-13-13 0,13 13 0,14 0 0,-27-14 0,13 14 15,-13-13-15,13 13 0,-13-13 0,14 13 0,-1 0 16,-13-27-16,13 27 0,-13-13 15,13 13-15,-13-13 0,27 13 0,-27-13 16,13 13-16,-13-13 0,13 13 0,-13-14 16,13 14-16,-13-13 0,14 13 0,-14-13 0,13-14 15,-13 14-15,13 13 0,-13-13 0,27 13 0,-27-13 16,13 0-16,-13-1 0,13 14 0,-13-13 0,0-13 16,13 26-16,-13-14 0,0 1 15,14 13-15,-14-13 0,0 0 16,13-1-16,-13 1 15,0-13-15,0 13 16,0-1-16,0 1 16,0 0-16,0 0 15,0-1-15,0-12 16,0 13 15,0-1-31,0 1 16,0 0-16,0 0 15,0 0-15,0-1 0,-13 14 16,13-26-16,0 13 0,-14 13 16,14-14-16,0 1 15,-13 13-15,13-13 16,-13 13-16,13-13 0,-27 13 16,27-13-16,-13-14 0,13 14 15,-13 13-15,13-13 0,-13 13 16,13-14-16,-14 14 0,14-13 15,-13 13-15,0 0 0,13-13 16,-26 13-16,12 0 0,14-13 16,-13 13-16,0 0 0,0 0 15,13-27-15,-14 27 0,1 0 0,-13 0 16,26-13-16,-14 13 0,1 0 0,0-13 16,0 13-16,0 0 0,-1-13 15,-12 13-15,13 0 0,-1 0 16,14-14-16,-13 14 0,0 0 0,0 0 15,0-13-15,-1 13 0,-12 0 16,13-13-16,-1 13 0,1 0 16,13-27-16,-13 27 0,0 0 0,-1 0 0,14-13 0,-26 13 15,13 0-15,13-13 0,-13 13 0,-1 0 0,1 0 16,0 0-16,13-13 0,-13 13 0,-14 0 0,14 0 0,13-14 16,-13 14-16,-1 0 0,1 0 0,0 0 0,13-13 0,-13 13 0,-14 0 15,14 0-15,0 0 0,0-13 0,-1 13 0,1 0 16,0 0-16,13-13 0,-13 13 0,-14 0 0,14 0 0,0 0 15,0-27-15,-1 27 0,1 0 0,0 0 0,-14-13 16,14 13-16,0 0 0,0 0 0,13-13 0,-13 13 0,-1 0 16,1 0-16,-13 0 0,12 0 0,14-13 0,-13 13 0,0 0 15,0 0-15,-1 0 0,1 0 0,13-14 0,-26 14 0,13 0 16,-1 0-16,1 0 0,0 0 0,0 0 16,-1 0-16,1 0 0,-13 0 0,12 0 15,1 0-15,13-13 0,-13 13 0,0 0 16,0 0-16,-1 0 0,-12 0 0,13 0 0,-1 0 15,1 0-15,0 0 0,0 0 0,-1 0 16,-12 0-16,13 0 0,0 0 0,-1-13 0,1 13 16,0 0-16,0 0 0,-14 0 0,14 0 15,0 0-15,0 0 0,-1 0 16,1 0-16,0 0 0,0 0 0,-14 0 16,14 0-16,0 0 0,-1 0 15,1 0-15,0 0 0,0 0 0,-14 0 0,14 0 16,0 0-16,0 0 0,13 13 0,-14-13 0,1 0 0,0 0 15,-14 0-15,14 0 0,0 0 0,0 0 16,0 0-16,-1 0 0,14 13 0,-13-13 0,0 0 0,-14 0 16,14 0-16,13 14 0,-13-14 0,0 0 15,13 13-15,-13-13 0,-1 0 0,14 13 0,-13-13 16,-13 0-16,26 27 0,-14-27 0,1 13 0,0-13 0,13 13 16,-13-13-16,-1 0 0,14 13 0,-13-13 0,-13 0 0,26 13 0,-13-13 15,-1 14-15,1-14 0,0 13 0,0-13 0,-1 13 16,-12-13-16,13 27 0,-1-27 0,1 13 0,0-13 15,13 13-15,-13-13 0,0 0 0,13 13 0,-14-13 0,14 14 16,-26-14-16,13 0 0,13 13 0,-14-13 0,14 13 0,-13-13 16,13 26-16,-13-26 0,13 14 0,-13-14 0,13 13 0,-14-13 15,14 13-15,-26-13 0,26 13 0,-13-13 0,13 14 16,-13-14-16,13 13 0,-14-13 0,14 26 0,-13-12 0,13-1 16,-13-13-16,13 13 0,-13 0 0,13 0 15,-27-13-15,27 14 0,-13 12 0,13-13 16,-13-13-16,13 14 0,0-1 0,-14-13 15,14 13-15,0 0 0,-13-13 0,13 13 0,0 1 16,-13-14-16,13 26 0,0-13 16,0 1-16,-13-14 0,13 13 0,0 0 0,0 0 15,0 1-15,-27-14 0,27 26 0,0-13 16,0 0-16,0 1 0,0-1 16,0 0-16,0 0 0,0 14 15,0-14-15,0 0 16,14 1-16,-14-1 0,13-13 15,-13 13-15,0 0 0,13-13 0,-13 27 0,13-27 16,-13 13-16,0 0 0,13-13 16,-13 13-16,0 1 0,14-14 15,-1 0-15,-13 13 0,26-13 16,-12 13-16,-1-13 16,0 0-16,-13 13 15,13-13-15,1 0 0,-1 0 0,-13 27 16,26-27-16,-13 13 0,1-13 15,-14 13-15,13-13 16,0 0-16,-13 13 0,13-13 16,1 0-16,12 0 15,-26 14-15,13-14 0,1 0 16,-1 0-16,0 0 16,0 0-1,0 0 1,1 0-16,12 0 15,-13 0 1,1 0 0,-1 0 31,-13 13-47,13-13 31</inkml:trace>
+  <inkml:trace contextRef="#ctx0" brushRef="#br0" timeOffset="8233.07">5689 4551 0,'13'0'31,"0"13"-31,0-13 0,0 0 16,-13 13-16,14-13 0,-1 0 0,0 0 0,0 0 0,-13 14 15,27-14-15,-14 0 0,0 0 0,1 0 0,-1 0 0,0 0 16,-13 13-16,13-13 0,14 0 0,-14 0 0,0 0 0,0 0 0,1 0 0,-1 0 16,0 13-16,13-13 0,-12 0 0,-1 0 0,0 0 0,0 0 15,1 0-15,-1 0 0,0 26 0,14-26 0,-14 0 0,0 0 0,0 0 16,0 0-16,1 0 0,-1 0 0,13 0 0,-12 0 0,-14 14 15,13-14-15,0 0 0,0 0 0,1 0 0,-1 0 0,13 0 0,-13 0 0,1 0 16,-1 0-16,0 0 0,0 0 0,-13 13 0,14-13 0,12 0 0,-13 0 0,1 0 16,-1 0-16,0 0 0,0 0 0,0 0 0,1 0 0,12 0 0,-13 0 0,1 0 15,-1 0-15,0 0 0,-13 13 0,13-13 0,1 0 0,12 0 0,-13 0 16,0 0-16,1 0 0,-1 0 0,0 0 0,0 0 16,14 0-16,-14 0 0,0 0 15,0 0-15,1 0 0,-1 0 16,0 0-16,14 0 0,-14 0 0,0 0 0,0 0 15,1 0-15,-1 0 0,0 0 0,0 0 0,14 0 0,-14 0 0,0 0 16,0 0-16,1 0 0,-1 0 0,0 0 0,14 0 0,-14 0 0,0 0 16,0 0-16,0 0 0,1 0 0,-1 0 0,13 13 0,-12-13 0,-1 0 0,0 0 15,0 0-15,0 0 0,1 0 0,12 0 0,-13 0 0,1 0 0,-1 0 16,0 0-16,0 0 0,1 0 0,-1 0 0,13 0 0,-26 14 0,13-14 0,1 0 16,-1 0-16,0 0 0,0 0 0,1 0 0,12 0 0,-13 0 0,1 0 15,-1 0-15,0 0 0,0 0 0,0 0 0,14 0 0,-14 0 0,0 0 16,1 0-16,-1 0 0,0 0 0,0 0 0,14 0 0,-14 0 15,0 0-15,0 0 0,1 0 0,-1 0 0,0 0 16,0 0-16,14 0 0,-14 0 0,0 0 0,1 0 16,-1 0-16,0 0 0,0 0 0,14 0 0,-14 0 15,0 0-15,0 0 0,1 0 0,-1 0 16,0 0-16,13 0 0,-12 0 0,-1 0 0,0 0 16,0 0-16,1 0 0,-1 0 0,13 0 15,-12 0-15,-1 0 0,0 0 16,0 0-16,0 0 0,1 0 15,-1 0-15,13 0 0,-12 0 16,-1 0-16,0 0 0,0 0 0,1 0 16,-1 0-16,13 0 0,-13 0 0,1 0 0,-1 0 15,0 0-15,0 0 0,1 0 0,12 0 0,-13 0 16,0 0-16,1 0 0,-1 0 0,0 0 0,0 0 0,14 0 16,-14 0-16,0 0 0,1 0 15,-14-14-15,13 14 0</inkml:trace>
+  <inkml:trace contextRef="#ctx0" brushRef="#br0" timeOffset="10366.65">15253 4577 0,'13'0'31,"1"0"-15,-1 0-16,0 0 16,14 0-16,-14 0 15,0 0-15,0 0 0,1 0 16,-1 0-16,0 0 0,0 0 16,14 0-16,-14 0 15,0 0-15,-13 14 0,13-14 0,1 0 16,-1 0-16,0 0 15,14 0-15,-14 0 0,0 0 0,0 0 16,0 0-16,1 0 0,-1 0 0,13 0 16,-12 0-16,-1 0 0,0 0 0,0 0 15,0 0-15,1 0 0,-1 0 0,13 0 16,-12 0-16,-1 0 0,-13 13 0,13-13 0,0 0 0,1 0 16,-1 0-16,13 0 0,-13 0 0,1 0 15,-1 0-15,0 0 0,0 0 0,1 0 0,12 0 16,-13 0-16,1 0 0,-1 0 0,0 0 0,0 0 0,0 0 0,14 0 15,-14 0-15,0 0 0,1 0 0,-1 0 0,0 0 0,0 0 16,0 0-16,14 0 0,-14 0 0,0 0 0,1 0 16,-1 0-16,0 0 0,0 0 15,14 0-15,-14 26 0,0-26 16,0 0-16,1 0 16,-1 0-16,0 0 15,14 0-15,-14 0 0,0 0 16,0 0-16,1 0 0,-1 0 15,0 0-15,13 0 0,-12 0 0,-1 0 0,0 0 16,0 0-16,1 0 0,-1 0 0,0 0 16,14 0-16,-14 0 0,0 0 0,0 0 0,0 0 0,1 0 15,-1 0-15,13 0 0,-12 0 0,-1 0 0,0 0 0,-13-13 0,13 13 0,1 0 0,-1 0 16,13 0-16,-13 0 0,1 0 0,-1 0 0,0 0 0,0 0 0,1 0 0,-14-13 0,26 13 0,-13 0 0,0 0 16,1 0-16,-1 0 0,0 0 0,0 0 0,1 0 0,12 0 0,-13-13 0,1 13 0,-1 0 0,0 0 0,0 0 15,0 0-15,14 0 0,-14 0 0,0 0 0,-13-14 0,14 14 0,-1 0 0,0 0 0,0 0 0,14 0 0,-14 0 16,0 0-16,0 0 0,1 0 0,-1 0 0,-13-13 0,13 13 0,14 0 0,-14 0 0,0 0 15,0 0-15,0 0 0,1 0 0,-1 0 0,0 0 0,14 0 16,-27-13-16,13 13 0,0 0 0,0 0 0,1 0 0,-1 0 0,0 0 16,13 0-16,-12 0 0,-1 0 0,0 0 15,-13-13-15,13 13 0,1 0 16,-1 0 0,13 0-1,-12 0 1,-1 0-16,0 0 15,-13-27-15,13 27 0,0 0 16,1 0-16,12 0 0,-13 0 0,1-13 16,-1 13-16,0 0 0,0 0 0,1 0 15,-1 0-15,13 0 0,-13 0 0,1 0 0,-1 0 16,0 0-16,0 0 0,1 0 0,12 0 0,-26-13 0,13 13 0,1 0 16,-1 0-16,0 0 0,0 0 0,0 0 15,14 0-15,-14 0 0,0 0 0,1 0 0,-1 0 0,0 0 16,0 0-16,14 0 0,-14 0 0,0 0 0,0 0 15,1 0-15,-1 0 0,0 0 0,0 0 16,14 0-16,-14 0 0,0 0 0,0 0 0,1 0 16,-1 0-16,-13-14 15,13 14 1</inkml:trace>
+  <inkml:trace contextRef="#ctx0" brushRef="#br0" timeOffset="42560.25">17820 17026 0</inkml:trace>
+  <inkml:trace contextRef="#ctx0" brushRef="#br0" timeOffset="87074.86">25030 15372 0,'13'0'109,"0"0"-93,0 0-16,0 0 0,14 0 0,-14 0 16,0 0-16,1 0 0,-1 0 0,0 0 0,0 0 0,1 0 15,12 0-15,-13 0 0,0 0 0,1 0 0,-1 0 0,0 0 0,0 0 0,14 0 0,-14 0 0,0 0 0,1 0 16,-1 0-16,0 0 0,0 0 0,14 0 0,-14 0 0,0 0 0,0 0 0,1 0 0,-1 0 0,0 0 0,14 0 0,-14 0 0,0 0 0,13 0 15,-12 0-15,-1 0 0,13 0 0,-12 0 0,-1 0 0,13 0 0,-12 0 0,25 0 0,-26 0 0,1 0 0,-1 0 0,27 0 0,-27 0 0,13 0 0,-13 0 0,27 0 16,-27 0-16,14 0 0,13 0 0,-27 0 0,13 0 0,1 0 0,-1 0 0,14 0 0,-27 0 0,14 0 0,12 0 0,-26 0 0,14 0 0,-14 0 0,27 0 16,-14 0-16,1 0 0,-1 0 0,14 0 0,-27 0 0,14 0 0,-14 0 0,26 0 0,-12 0 0,-14 0 0,27 0 0,-14 0 0,-12 0 0,12 0 0,0 0 0,14 0 0,-13 0 15,-14 0-15,0 0 0,27 0 0,-14 0 0,-13 0 0,27 0 0,-27 0 0,1 0 0,25 0 0,-25 0 0,12 0 0,-13 0 0,0 0 0,27 0 0,-27 0 16,1 0-16,25 0 0,-26 0 0,1 0 0,12 0 0,-13 0 0,14 0 0,-1 0 0,1 0 0,-1 0 0,-13 0 0,1 0 0,-1 0 0,0 0 0,0 0 16,1 0-16,12 0 0,1 0 0,-14 0 0,0 0 0,0 0 0,27 0 0,-27 0 0,0 0 0,1 0 0,-1 0 0,13 0 0,-13 0 15,1 0-15,-1 0 0,0 0 0,0 0 0,1 0 0,-1 0 0,13 0 0,-12 0 0,-1 0 0,0 0 0,0 0 0,0 0 0,1 0 0,12 0 16,-13 0-16,1 0 0,-1 0 0,0 0 0,0 0 0,1 0 0,12 0 0,-13 0 0,0 0 15,-13 27-15,14-27 0,-1 0 0,0 0 0,0 0 0,14 0 0,-14 0 16,0 0-16,1 0 0,-1 0 16,0 0-1,0 0 1,0 0-16,14 0 0,-14 0 16,0 0-16,1 0 0,-1 0 15,0 0-15,0 0 0,14 0 0,-14 0 16,0 0-16,0 13 0,1-13 0,-1 0 15,0 0-15,14 0 0,-14 0 16,0 0 0,-13-26 156,13 26-172,-13-14 0,0 1 0,0 0 0,0 0 15,0-1-15,13 1 0,-13 0 0,0-14 0,0 14 0,0 0 0,0 0 0,0 0 0,0-1 16,0 1-16,14 13 0,-14-26 0,0 12 0,0 1 0,0 0 0,0 0 0,0-1 0,0 1 0,0-13 15,0 13-15,0-1 0,0 1 0,0 0 0,0 0 0,0-1 0,0-12 0,0 13 16,0-1-16,0 1 0,13 0 0,-13 0 0,0 0 0,0-1 16,0-12-16,0 13 0,0-1 0,0 1 0,0 0 15,0 0-15,0 0 0,0-14 0,0 14 16,0 0-16,0-1 0,0 1 16,0 0-16,0 0 0,0-14 15,0 14-15,0 0 0,0 0 16,-13-1-16,13 1 0,0 0 0,0-14 15,0 14-15,-14 0 0,14 0 0,0-1 16,0 1-16,0 0 0,0 0 0,-13 13 16,13-27-16,0 14 0,0 0 0,0 0 0,0-1 15,0 1-15,-13 13 0,13-13 0,0-13 0,0 12 0,0 1 0,0 0 16,0 0-16,-13 13 0,13-14 0,0 1 0,0-13 0,0 12 16,0 1-16,0 0 0,0 0 0,0 0 0,-27 13 0,27-14 0,0 1 0,0-13 15,0 12-15,0 1 0,0 0 0,0 0 0,-13-1 0,13 1 0,0-13 16,0 13-16,0-1 0,0 1 0,0 0 15,-13 13-15,13-13 0,0-1 0,0-12 0,0 13 16,0-1-16,0 1 16,-13 13-16,13-13 0,0 0 15,0 0 17,-14 13-32,14-27 15,0 14 1,-13 13 15,13-13-31,-13 13 16,-13 0-1,26-14-15,-14 14 0,1 0 0,13-13 16,-13 13-16,0 0 0,-1 0 0,14-13 0,-13 13 0,-13 0 0,12 0 0,1 0 16,0 0-16,0-13 0,0 13 0,-1 0 0,1 0 0,-13 0 0,12 0 0,1 0 0,0 0 15,0 0-15,-1-14 0,1 14 0,-13 0 0,13 0 0,-1 0 0,1 0 0,0 0 0,0 0 0,-1 0 0,-12 0 0,13 0 0,-1 0 16,1 0-16,0 0 0,-27 0 0,27 0 0,0-26 0,0 26 0,-1 0 0,1 0 0,0 0 0,0 0 0,-14 0 0,14 0 0,0 0 0,0 0 0,-1 0 15,1 0-15,-27 0 0,27 0 0,0 0 0,0 0 0,0 0 0,-1 0 0,-25 0 0,25 0 0,1 0 0,0 0 0,0 0 0,-14 0 0,14 0 0,-13 0 0,12-13 16,1 13-16,0 0 0,-14 0 0,14 0 0,0 0 0,-14 0 0,14 0 0,-26 0 0,25 0 0,1 0 0,0 0 0,0 0 0,-14 0 0,14-13 0,0 13 16,0 0-16,-14 0 0,1 0 0,12 0 0,1 0 0,0 0 0,0 0 0,-1 0 0,1 0 0,-26-14 0,25 14 0,-12 0 0,-1 0 0,14 0 15,0 0-15,0 0 0,-1 0 0,1 0 0,0 0 0,-13 0 0,12 0 0,1 0 0,0 0 0,0-13 0,-1 13 0,1 0 16,0 0-16,-14 0 0,14 0 0,0 0 0,0 0 0,0 0 0,-1 0 0,1 0 0,-13 0 0,12 0 0,1 0 16,0 0-16,0 0 0,-1 0 0,1 0 0,-13 0 0,13 0 0,-1 0 0,1 0 0,0 0 0,0 0 15,-1 0-15,-12 0 0,13 0 0,0 0 0,-1 0 0,1 0 0,0 0 0,0 0 0,-1 0 16,-12 0-16,13 0 0,-1 0 0,1 0 0,0 0 0,0 0 0,0 0 0,-14 0 0,14 0 15,0 0-15,-1 0 0,1 0 0,0 0 0,0 0 0,-14 0 0,14 13 0,0-13 0,0 0 0,-1 0 16,1 0-16,0 0 0,-14 0 0,14 0 0,0 0 0,0 0 16,0 0-16,-1 0 0,1 0 0,0 0 0,13 14 0,-27-14 0,14 0 0,0 0 15,0 0-15,-1 0 0,1 0 0,0 0 0,-13 0 0,12 0 16,1 0-16,0 0 0,0 0 0,-1 0 0,1 0 16,-13 0-16,12 0 0,1 0 0,0 0 0,0 0 15,0 0-15,-1 0 0,-12 0 0,13 0 16,-1 0-16,1 0 0,0 0 0,0 0 15,-1 0-15,1 0 0,-13 0 0,13 0 16,-1 0-16,1 0 0,0 0 16,13 13 124,-13-13-140,13 13 16,-14-13-16,14 26 0,0-12 16,-26-14-16,26 13 0,-13 0 0,13 0 0,-14 1 0,14-1 15,-13 0-15,13 14 0,-13-14 0,13 0 0,0 0 0,-13-13 0,13 13 0,0 1 0,-13-1 16,13 13-16,0-12 0,-27-14 0,27 13 0,0 0 0,0 0 0,-13-13 0,13 14 0,0-1 0,0 13 0,-13-26 0,13 13 0,0 1 15,-14-1-15,14 0 0,0 0 0,-13 1 0,13 12 0,0-13 0,-13 1 0,13-1 0,-13 0 0,13 0 0,0 0 0,-13 1 0,13 12 0,0-13 16,0 1-16,-27-1 0,27 0 0,-13 0 0,13 1 0,0 12 0,-13-13 0,13 0 0,0 1 0,-14-1 0,14 0 0,0 0 0,0 14 0,-13-14 16,13 0-16,-13 0 0,13 14 0,-13-1 0,13-12 0,0-1 0,-27 13 0,27-12 0,0-1 0,-13 0 0,13 13 0,0-12 15,-13-1-15,13 0 0,0 0 0,-13 1 0,13-1 0,0 13 0,-14-12 0,14-1 0,0 0 0,0 0 0,-13-13 0,13 13 0,0 1 16,0 12-16,0-13 0,-13-13 0,13 14 0,0-1 0,0 0 0,0 0 0,0 0 0,-27-13 0,27 27 16,0-14-16,0 0 0,0 1 0,0-1 0,0 0 0,0 0 15,0 1-15,0 12 16,0-13-1,0 0 32</inkml:trace>
+</inkml:ink>
+</file>
+
 <file path=ppt/notesMasters/notesMaster1.xml><?xml version="1.0" encoding="utf-8"?>
 <p:notesMaster xmlns:a="http://schemas.openxmlformats.org/drawingml/2006/main" xmlns:r="http://schemas.openxmlformats.org/officeDocument/2006/relationships" xmlns:p="http://schemas.openxmlformats.org/presentationml/2006/main">
   <p:cSld>
@@ -8811,7 +8843,7 @@
           <a:p>
             <a:fld id="{F666E1FD-E7A0-497B-BBC0-740BAAC97C64}" type="datetimeFigureOut">
               <a:rPr lang="en-PH" smtClean="0"/>
-              <a:t>21/05/2023</a:t>
+              <a:t>22/05/2023</a:t>
             </a:fld>
             <a:endParaRPr lang="en-PH"/>
           </a:p>
@@ -9816,7 +9848,7 @@
           <a:p>
             <a:fld id="{0CCF0B81-6BD8-4C65-9459-815598C5F1F4}" type="datetimeFigureOut">
               <a:rPr lang="en-PH" smtClean="0"/>
-              <a:t>21/05/2023</a:t>
+              <a:t>22/05/2023</a:t>
             </a:fld>
             <a:endParaRPr lang="en-PH"/>
           </a:p>
@@ -10016,7 +10048,7 @@
           <a:p>
             <a:fld id="{0CCF0B81-6BD8-4C65-9459-815598C5F1F4}" type="datetimeFigureOut">
               <a:rPr lang="en-PH" smtClean="0"/>
-              <a:t>21/05/2023</a:t>
+              <a:t>22/05/2023</a:t>
             </a:fld>
             <a:endParaRPr lang="en-PH"/>
           </a:p>
@@ -10226,7 +10258,7 @@
           <a:p>
             <a:fld id="{0CCF0B81-6BD8-4C65-9459-815598C5F1F4}" type="datetimeFigureOut">
               <a:rPr lang="en-PH" smtClean="0"/>
-              <a:t>21/05/2023</a:t>
+              <a:t>22/05/2023</a:t>
             </a:fld>
             <a:endParaRPr lang="en-PH"/>
           </a:p>
@@ -10426,7 +10458,7 @@
           <a:p>
             <a:fld id="{0CCF0B81-6BD8-4C65-9459-815598C5F1F4}" type="datetimeFigureOut">
               <a:rPr lang="en-PH" smtClean="0"/>
-              <a:t>21/05/2023</a:t>
+              <a:t>22/05/2023</a:t>
             </a:fld>
             <a:endParaRPr lang="en-PH"/>
           </a:p>
@@ -10702,7 +10734,7 @@
           <a:p>
             <a:fld id="{0CCF0B81-6BD8-4C65-9459-815598C5F1F4}" type="datetimeFigureOut">
               <a:rPr lang="en-PH" smtClean="0"/>
-              <a:t>21/05/2023</a:t>
+              <a:t>22/05/2023</a:t>
             </a:fld>
             <a:endParaRPr lang="en-PH"/>
           </a:p>
@@ -10970,7 +11002,7 @@
           <a:p>
             <a:fld id="{0CCF0B81-6BD8-4C65-9459-815598C5F1F4}" type="datetimeFigureOut">
               <a:rPr lang="en-PH" smtClean="0"/>
-              <a:t>21/05/2023</a:t>
+              <a:t>22/05/2023</a:t>
             </a:fld>
             <a:endParaRPr lang="en-PH"/>
           </a:p>
@@ -11385,7 +11417,7 @@
           <a:p>
             <a:fld id="{0CCF0B81-6BD8-4C65-9459-815598C5F1F4}" type="datetimeFigureOut">
               <a:rPr lang="en-PH" smtClean="0"/>
-              <a:t>21/05/2023</a:t>
+              <a:t>22/05/2023</a:t>
             </a:fld>
             <a:endParaRPr lang="en-PH"/>
           </a:p>
@@ -11527,7 +11559,7 @@
           <a:p>
             <a:fld id="{0CCF0B81-6BD8-4C65-9459-815598C5F1F4}" type="datetimeFigureOut">
               <a:rPr lang="en-PH" smtClean="0"/>
-              <a:t>21/05/2023</a:t>
+              <a:t>22/05/2023</a:t>
             </a:fld>
             <a:endParaRPr lang="en-PH"/>
           </a:p>
@@ -11640,7 +11672,7 @@
           <a:p>
             <a:fld id="{0CCF0B81-6BD8-4C65-9459-815598C5F1F4}" type="datetimeFigureOut">
               <a:rPr lang="en-PH" smtClean="0"/>
-              <a:t>21/05/2023</a:t>
+              <a:t>22/05/2023</a:t>
             </a:fld>
             <a:endParaRPr lang="en-PH"/>
           </a:p>
@@ -11953,7 +11985,7 @@
           <a:p>
             <a:fld id="{0CCF0B81-6BD8-4C65-9459-815598C5F1F4}" type="datetimeFigureOut">
               <a:rPr lang="en-PH" smtClean="0"/>
-              <a:t>21/05/2023</a:t>
+              <a:t>22/05/2023</a:t>
             </a:fld>
             <a:endParaRPr lang="en-PH"/>
           </a:p>
@@ -12242,7 +12274,7 @@
           <a:p>
             <a:fld id="{0CCF0B81-6BD8-4C65-9459-815598C5F1F4}" type="datetimeFigureOut">
               <a:rPr lang="en-PH" smtClean="0"/>
-              <a:t>21/05/2023</a:t>
+              <a:t>22/05/2023</a:t>
             </a:fld>
             <a:endParaRPr lang="en-PH"/>
           </a:p>
@@ -12485,7 +12517,7 @@
           <a:p>
             <a:fld id="{0CCF0B81-6BD8-4C65-9459-815598C5F1F4}" type="datetimeFigureOut">
               <a:rPr lang="en-PH" smtClean="0"/>
-              <a:t>21/05/2023</a:t>
+              <a:t>22/05/2023</a:t>
             </a:fld>
             <a:endParaRPr lang="en-PH"/>
           </a:p>
@@ -14634,7 +14666,7 @@
                     <a:p>
                       <a:pPr algn="ctr"/>
                       <a:r>
-                        <a:rPr lang="en-US"/>
+                        <a:rPr lang="en-US" dirty="0"/>
                         <a:t>Singleton</a:t>
                       </a:r>
                       <a:endParaRPr lang="en-PH" dirty="0"/>
@@ -14649,7 +14681,7 @@
                     <a:p>
                       <a:pPr algn="ctr"/>
                       <a:r>
-                        <a:rPr lang="en-US"/>
+                        <a:rPr lang="en-US" dirty="0"/>
                         <a:t>Adapter</a:t>
                       </a:r>
                       <a:endParaRPr lang="en-PH" dirty="0"/>
@@ -14664,7 +14696,7 @@
                     <a:p>
                       <a:pPr algn="ctr"/>
                       <a:r>
-                        <a:rPr lang="en-US"/>
+                        <a:rPr lang="en-US" dirty="0"/>
                         <a:t>Chain of Responsibility</a:t>
                       </a:r>
                       <a:endParaRPr lang="en-PH" dirty="0"/>
@@ -14701,7 +14733,7 @@
                     <a:p>
                       <a:pPr algn="ctr"/>
                       <a:r>
-                        <a:rPr lang="en-US"/>
+                        <a:rPr lang="en-US" dirty="0"/>
                         <a:t>Composite</a:t>
                       </a:r>
                       <a:endParaRPr lang="en-PH" dirty="0"/>
@@ -14716,7 +14748,7 @@
                     <a:p>
                       <a:pPr algn="ctr"/>
                       <a:r>
-                        <a:rPr lang="en-US"/>
+                        <a:rPr lang="en-US" dirty="0"/>
                         <a:t>Command</a:t>
                       </a:r>
                       <a:endParaRPr lang="en-PH" dirty="0"/>
@@ -14753,7 +14785,7 @@
                     <a:p>
                       <a:pPr algn="ctr"/>
                       <a:r>
-                        <a:rPr lang="en-US"/>
+                        <a:rPr lang="en-US" dirty="0"/>
                         <a:t>Proxy</a:t>
                       </a:r>
                       <a:endParaRPr lang="en-PH" dirty="0"/>
@@ -14768,7 +14800,7 @@
                     <a:p>
                       <a:pPr algn="ctr"/>
                       <a:r>
-                        <a:rPr lang="en-US"/>
+                        <a:rPr lang="en-US" dirty="0"/>
                         <a:t>Interpreter</a:t>
                       </a:r>
                       <a:endParaRPr lang="en-PH" dirty="0"/>
@@ -14805,7 +14837,7 @@
                     <a:p>
                       <a:pPr algn="ctr"/>
                       <a:r>
-                        <a:rPr lang="en-US"/>
+                        <a:rPr lang="en-US" dirty="0"/>
                         <a:t>Flyweight</a:t>
                       </a:r>
                       <a:endParaRPr lang="en-PH" dirty="0"/>
@@ -14820,7 +14852,7 @@
                     <a:p>
                       <a:pPr algn="ctr"/>
                       <a:r>
-                        <a:rPr lang="en-US"/>
+                        <a:rPr lang="en-US" dirty="0"/>
                         <a:t>Iterator</a:t>
                       </a:r>
                       <a:endParaRPr lang="en-PH" dirty="0"/>
@@ -14857,7 +14889,7 @@
                     <a:p>
                       <a:pPr algn="ctr"/>
                       <a:r>
-                        <a:rPr lang="en-US"/>
+                        <a:rPr lang="en-US" dirty="0"/>
                         <a:t>Facade</a:t>
                       </a:r>
                       <a:endParaRPr lang="en-PH" dirty="0"/>
@@ -14905,10 +14937,9 @@
                     <a:p>
                       <a:pPr algn="ctr"/>
                       <a:r>
-                        <a:rPr lang="en-US"/>
+                        <a:rPr lang="en-US" dirty="0"/>
                         <a:t>Bridge </a:t>
                       </a:r>
-                      <a:endParaRPr lang="en-US" dirty="0"/>
                     </a:p>
                   </a:txBody>
                   <a:tcPr/>
@@ -14920,7 +14951,7 @@
                     <a:p>
                       <a:pPr algn="ctr"/>
                       <a:r>
-                        <a:rPr lang="en-US"/>
+                        <a:rPr lang="en-US" dirty="0"/>
                         <a:t>Memento</a:t>
                       </a:r>
                       <a:endParaRPr lang="en-PH" dirty="0"/>
@@ -14953,7 +14984,7 @@
                     <a:p>
                       <a:pPr algn="ctr"/>
                       <a:r>
-                        <a:rPr lang="en-US"/>
+                        <a:rPr lang="en-US" dirty="0"/>
                         <a:t>Decorator</a:t>
                       </a:r>
                       <a:endParaRPr lang="en-PH" dirty="0"/>
@@ -14986,6 +15017,57 @@
           </a:graphicData>
         </a:graphic>
       </p:graphicFrame>
+      <mc:AlternateContent xmlns:mc="http://schemas.openxmlformats.org/markup-compatibility/2006">
+        <mc:Choice xmlns:p14="http://schemas.microsoft.com/office/powerpoint/2010/main" Requires="p14">
+          <p:contentPart p14:bwMode="auto" r:id="rId4">
+            <p14:nvContentPartPr>
+              <p14:cNvPr id="3" name="Ink 2">
+                <a:extLst>
+                  <a:ext uri="{FF2B5EF4-FFF2-40B4-BE49-F238E27FC236}">
+                    <a16:creationId xmlns:a16="http://schemas.microsoft.com/office/drawing/2014/main" id="{93E08471-973A-AC3E-A412-0C13FB5382CF}"/>
+                  </a:ext>
+                </a:extLst>
+              </p14:cNvPr>
+              <p14:cNvContentPartPr/>
+              <p14:nvPr/>
+            </p14:nvContentPartPr>
+            <p14:xfrm>
+              <a:off x="2048040" y="1609560"/>
+              <a:ext cx="8196480" cy="4520160"/>
+            </p14:xfrm>
+          </p:contentPart>
+        </mc:Choice>
+        <mc:Fallback>
+          <p:pic>
+            <p:nvPicPr>
+              <p:cNvPr id="3" name="Ink 2">
+                <a:extLst>
+                  <a:ext uri="{FF2B5EF4-FFF2-40B4-BE49-F238E27FC236}">
+                    <a16:creationId xmlns:a16="http://schemas.microsoft.com/office/drawing/2014/main" id="{93E08471-973A-AC3E-A412-0C13FB5382CF}"/>
+                  </a:ext>
+                </a:extLst>
+              </p:cNvPr>
+              <p:cNvPicPr/>
+              <p:nvPr/>
+            </p:nvPicPr>
+            <p:blipFill>
+              <a:blip r:embed="rId5"/>
+              <a:stretch>
+                <a:fillRect/>
+              </a:stretch>
+            </p:blipFill>
+            <p:spPr>
+              <a:xfrm>
+                <a:off x="2038680" y="1600200"/>
+                <a:ext cx="8215200" cy="4538880"/>
+              </a:xfrm>
+              <a:prstGeom prst="rect">
+                <a:avLst/>
+              </a:prstGeom>
+            </p:spPr>
+          </p:pic>
+        </mc:Fallback>
+      </mc:AlternateContent>
     </p:spTree>
     <p:extLst>
       <p:ext uri="{BB962C8B-B14F-4D97-AF65-F5344CB8AC3E}">

</xml_diff>

<commit_message>
Added images in week_9
</commit_message>
<xml_diff>
--- a/week_9/Design Patterns.pptx
+++ b/week_9/Design Patterns.pptx
@@ -8843,7 +8843,7 @@
           <a:p>
             <a:fld id="{F666E1FD-E7A0-497B-BBC0-740BAAC97C64}" type="datetimeFigureOut">
               <a:rPr lang="en-PH" smtClean="0"/>
-              <a:t>22/05/2023</a:t>
+              <a:t>5/23/23</a:t>
             </a:fld>
             <a:endParaRPr lang="en-PH"/>
           </a:p>
@@ -9848,7 +9848,7 @@
           <a:p>
             <a:fld id="{0CCF0B81-6BD8-4C65-9459-815598C5F1F4}" type="datetimeFigureOut">
               <a:rPr lang="en-PH" smtClean="0"/>
-              <a:t>22/05/2023</a:t>
+              <a:t>5/23/23</a:t>
             </a:fld>
             <a:endParaRPr lang="en-PH"/>
           </a:p>
@@ -10048,7 +10048,7 @@
           <a:p>
             <a:fld id="{0CCF0B81-6BD8-4C65-9459-815598C5F1F4}" type="datetimeFigureOut">
               <a:rPr lang="en-PH" smtClean="0"/>
-              <a:t>22/05/2023</a:t>
+              <a:t>5/23/23</a:t>
             </a:fld>
             <a:endParaRPr lang="en-PH"/>
           </a:p>
@@ -10258,7 +10258,7 @@
           <a:p>
             <a:fld id="{0CCF0B81-6BD8-4C65-9459-815598C5F1F4}" type="datetimeFigureOut">
               <a:rPr lang="en-PH" smtClean="0"/>
-              <a:t>22/05/2023</a:t>
+              <a:t>5/23/23</a:t>
             </a:fld>
             <a:endParaRPr lang="en-PH"/>
           </a:p>
@@ -10458,7 +10458,7 @@
           <a:p>
             <a:fld id="{0CCF0B81-6BD8-4C65-9459-815598C5F1F4}" type="datetimeFigureOut">
               <a:rPr lang="en-PH" smtClean="0"/>
-              <a:t>22/05/2023</a:t>
+              <a:t>5/23/23</a:t>
             </a:fld>
             <a:endParaRPr lang="en-PH"/>
           </a:p>
@@ -10734,7 +10734,7 @@
           <a:p>
             <a:fld id="{0CCF0B81-6BD8-4C65-9459-815598C5F1F4}" type="datetimeFigureOut">
               <a:rPr lang="en-PH" smtClean="0"/>
-              <a:t>22/05/2023</a:t>
+              <a:t>5/23/23</a:t>
             </a:fld>
             <a:endParaRPr lang="en-PH"/>
           </a:p>
@@ -11002,7 +11002,7 @@
           <a:p>
             <a:fld id="{0CCF0B81-6BD8-4C65-9459-815598C5F1F4}" type="datetimeFigureOut">
               <a:rPr lang="en-PH" smtClean="0"/>
-              <a:t>22/05/2023</a:t>
+              <a:t>5/23/23</a:t>
             </a:fld>
             <a:endParaRPr lang="en-PH"/>
           </a:p>
@@ -11417,7 +11417,7 @@
           <a:p>
             <a:fld id="{0CCF0B81-6BD8-4C65-9459-815598C5F1F4}" type="datetimeFigureOut">
               <a:rPr lang="en-PH" smtClean="0"/>
-              <a:t>22/05/2023</a:t>
+              <a:t>5/23/23</a:t>
             </a:fld>
             <a:endParaRPr lang="en-PH"/>
           </a:p>
@@ -11559,7 +11559,7 @@
           <a:p>
             <a:fld id="{0CCF0B81-6BD8-4C65-9459-815598C5F1F4}" type="datetimeFigureOut">
               <a:rPr lang="en-PH" smtClean="0"/>
-              <a:t>22/05/2023</a:t>
+              <a:t>5/23/23</a:t>
             </a:fld>
             <a:endParaRPr lang="en-PH"/>
           </a:p>
@@ -11672,7 +11672,7 @@
           <a:p>
             <a:fld id="{0CCF0B81-6BD8-4C65-9459-815598C5F1F4}" type="datetimeFigureOut">
               <a:rPr lang="en-PH" smtClean="0"/>
-              <a:t>22/05/2023</a:t>
+              <a:t>5/23/23</a:t>
             </a:fld>
             <a:endParaRPr lang="en-PH"/>
           </a:p>
@@ -11985,7 +11985,7 @@
           <a:p>
             <a:fld id="{0CCF0B81-6BD8-4C65-9459-815598C5F1F4}" type="datetimeFigureOut">
               <a:rPr lang="en-PH" smtClean="0"/>
-              <a:t>22/05/2023</a:t>
+              <a:t>5/23/23</a:t>
             </a:fld>
             <a:endParaRPr lang="en-PH"/>
           </a:p>
@@ -12274,7 +12274,7 @@
           <a:p>
             <a:fld id="{0CCF0B81-6BD8-4C65-9459-815598C5F1F4}" type="datetimeFigureOut">
               <a:rPr lang="en-PH" smtClean="0"/>
-              <a:t>22/05/2023</a:t>
+              <a:t>5/23/23</a:t>
             </a:fld>
             <a:endParaRPr lang="en-PH"/>
           </a:p>
@@ -12517,7 +12517,7 @@
           <a:p>
             <a:fld id="{0CCF0B81-6BD8-4C65-9459-815598C5F1F4}" type="datetimeFigureOut">
               <a:rPr lang="en-PH" smtClean="0"/>
-              <a:t>22/05/2023</a:t>
+              <a:t>5/23/23</a:t>
             </a:fld>
             <a:endParaRPr lang="en-PH"/>
           </a:p>
@@ -13661,10 +13661,9 @@
           <a:lstStyle/>
           <a:p>
             <a:r>
-              <a:rPr lang="en-PH" sz="5400" b="1"/>
+              <a:rPr lang="en-PH" sz="5000" b="1" dirty="0"/>
               <a:t>Benefits of using Design Patterns</a:t>
             </a:r>
-            <a:endParaRPr lang="en-PH" sz="5000" b="1" dirty="0"/>
           </a:p>
         </p:txBody>
       </p:sp>
@@ -15017,8 +15016,8 @@
           </a:graphicData>
         </a:graphic>
       </p:graphicFrame>
-      <mc:AlternateContent xmlns:mc="http://schemas.openxmlformats.org/markup-compatibility/2006">
-        <mc:Choice xmlns:p14="http://schemas.microsoft.com/office/powerpoint/2010/main" Requires="p14">
+      <mc:AlternateContent xmlns:mc="http://schemas.openxmlformats.org/markup-compatibility/2006" xmlns:p14="http://schemas.microsoft.com/office/powerpoint/2010/main">
+        <mc:Choice Requires="p14">
           <p:contentPart p14:bwMode="auto" r:id="rId4">
             <p14:nvContentPartPr>
               <p14:cNvPr id="3" name="Ink 2">
@@ -15037,7 +15036,7 @@
             </p14:xfrm>
           </p:contentPart>
         </mc:Choice>
-        <mc:Fallback>
+        <mc:Fallback xmlns="">
           <p:pic>
             <p:nvPicPr>
               <p:cNvPr id="3" name="Ink 2">

</xml_diff>